<commit_message>
Calendar list template corrections
</commit_message>
<xml_diff>
--- a/Apresentacao_Angular_Calendar.pptx
+++ b/Apresentacao_Angular_Calendar.pptx
@@ -3953,7 +3953,7 @@
             </a:pPr>
             <a:r>
               <a:rPr lang="pt-BR" dirty="0"/>
-              <a:t>25/02/2022</a:t>
+              <a:t>01/03/2022</a:t>
             </a:r>
             <a:endParaRPr dirty="0"/>
           </a:p>
@@ -4313,7 +4313,7 @@
             </a:pPr>
             <a:r>
               <a:rPr lang="pt-BR" dirty="0"/>
-              <a:t>6 anos no mercado e 2 anos como instrutor;</a:t>
+              <a:t>7 anos no mercado e 2 anos como instrutor;</a:t>
             </a:r>
           </a:p>
           <a:p>

</xml_diff>